<commit_message>
Initialized React Native project on Expo CLI for mobile client
</commit_message>
<xml_diff>
--- a/Design/Presentations/Presentation1.pptx
+++ b/Design/Presentations/Presentation1.pptx
@@ -218,7 +218,7 @@
           <a:p>
             <a:fld id="{6E6A663A-D2B2-F74D-BCBD-DF755A8C1EAF}" type="datetimeFigureOut">
               <a:rPr lang="en-US" smtClean="0"/>
-              <a:t>6/19/19</a:t>
+              <a:t>6/28/19</a:t>
             </a:fld>
             <a:endParaRPr lang="en-US"/>
           </a:p>
@@ -649,7 +649,7 @@
           <a:p>
             <a:fld id="{1160EA64-D806-43AC-9DF2-F8C432F32B4C}" type="datetimeFigureOut">
               <a:rPr lang="en-US" dirty="0"/>
-              <a:t>6/19/19</a:t>
+              <a:t>6/28/19</a:t>
             </a:fld>
             <a:endParaRPr lang="en-US" dirty="0"/>
           </a:p>
@@ -815,7 +815,7 @@
           <a:p>
             <a:fld id="{E9F9C37B-1D36-470B-8223-D6C91242EC14}" type="datetimeFigureOut">
               <a:rPr lang="en-US" dirty="0"/>
-              <a:t>6/19/19</a:t>
+              <a:t>6/28/19</a:t>
             </a:fld>
             <a:endParaRPr lang="en-US" dirty="0"/>
           </a:p>
@@ -990,7 +990,7 @@
           <a:p>
             <a:fld id="{67C6F52A-A82B-47A2-A83A-8C4C91F2D59F}" type="datetimeFigureOut">
               <a:rPr lang="en-US" dirty="0"/>
-              <a:t>6/19/19</a:t>
+              <a:t>6/28/19</a:t>
             </a:fld>
             <a:endParaRPr lang="en-US" dirty="0"/>
           </a:p>
@@ -1155,7 +1155,7 @@
           <a:p>
             <a:fld id="{F070A7B3-6521-4DCA-87E5-044747A908C1}" type="datetimeFigureOut">
               <a:rPr lang="en-US" dirty="0"/>
-              <a:t>6/19/19</a:t>
+              <a:t>6/28/19</a:t>
             </a:fld>
             <a:endParaRPr lang="en-US" dirty="0"/>
           </a:p>
@@ -1419,7 +1419,7 @@
           <a:p>
             <a:fld id="{1160EA64-D806-43AC-9DF2-F8C432F32B4C}" type="datetimeFigureOut">
               <a:rPr lang="en-US" dirty="0"/>
-              <a:t>6/19/19</a:t>
+              <a:t>6/28/19</a:t>
             </a:fld>
             <a:endParaRPr lang="en-US" dirty="0"/>
           </a:p>
@@ -1647,7 +1647,7 @@
           <a:p>
             <a:fld id="{AB134690-1557-4C89-A502-4959FE7FAD70}" type="datetimeFigureOut">
               <a:rPr lang="en-US" dirty="0"/>
-              <a:t>6/19/19</a:t>
+              <a:t>6/28/19</a:t>
             </a:fld>
             <a:endParaRPr lang="en-US" dirty="0"/>
           </a:p>
@@ -2001,7 +2001,7 @@
           <a:p>
             <a:fld id="{4F7D4976-E339-4826-83B7-FBD03F55ECF8}" type="datetimeFigureOut">
               <a:rPr lang="en-US" dirty="0"/>
-              <a:t>6/19/19</a:t>
+              <a:t>6/28/19</a:t>
             </a:fld>
             <a:endParaRPr lang="en-US" dirty="0"/>
           </a:p>
@@ -2137,7 +2137,7 @@
           <a:p>
             <a:fld id="{E1037C31-9E7A-4F99-8774-A0E530DE1A42}" type="datetimeFigureOut">
               <a:rPr lang="en-US" dirty="0"/>
-              <a:t>6/19/19</a:t>
+              <a:t>6/28/19</a:t>
             </a:fld>
             <a:endParaRPr lang="en-US" dirty="0"/>
           </a:p>
@@ -2227,7 +2227,7 @@
           <a:p>
             <a:fld id="{C278504F-A551-4DE0-9316-4DCD1D8CC752}" type="datetimeFigureOut">
               <a:rPr lang="en-US" dirty="0"/>
-              <a:t>6/19/19</a:t>
+              <a:t>6/28/19</a:t>
             </a:fld>
             <a:endParaRPr lang="en-US" dirty="0"/>
           </a:p>
@@ -2579,7 +2579,7 @@
           <a:p>
             <a:fld id="{D1BE4249-C0D0-4B06-8692-E8BB871AF643}" type="datetimeFigureOut">
               <a:rPr lang="en-US" dirty="0"/>
-              <a:t>6/19/19</a:t>
+              <a:t>6/28/19</a:t>
             </a:fld>
             <a:endParaRPr lang="en-US" dirty="0"/>
           </a:p>
@@ -2931,7 +2931,7 @@
           <a:p>
             <a:fld id="{042B0DB6-F5C7-45FB-8CF3-31B45F9C2DAC}" type="datetimeFigureOut">
               <a:rPr lang="en-US" dirty="0"/>
-              <a:t>6/19/19</a:t>
+              <a:t>6/28/19</a:t>
             </a:fld>
             <a:endParaRPr lang="en-US" dirty="0"/>
           </a:p>
@@ -3167,7 +3167,7 @@
           <a:p>
             <a:fld id="{1160EA64-D806-43AC-9DF2-F8C432F32B4C}" type="datetimeFigureOut">
               <a:rPr lang="en-US" dirty="0"/>
-              <a:t>6/19/19</a:t>
+              <a:t>6/28/19</a:t>
             </a:fld>
             <a:endParaRPr lang="en-US" dirty="0"/>
           </a:p>
@@ -4328,7 +4328,7 @@
                 <a:ea typeface="Helvetica Neue" charset="0"/>
                 <a:cs typeface="Helvetica Neue" charset="0"/>
               </a:rPr>
-              <a:t>Wave Music</a:t>
+              <a:t>A Global Context</a:t>
             </a:r>
             <a:endParaRPr lang="en-US" dirty="0">
               <a:latin typeface="Helvetica Neue" charset="0"/>
@@ -4360,86 +4360,104 @@
           </a:bodyPr>
           <a:lstStyle/>
           <a:p>
+            <a:pPr fontAlgn="base"/>
+            <a:r>
+              <a:rPr lang="en-US" dirty="0">
+                <a:latin typeface="Helvetica" charset="0"/>
+                <a:ea typeface="Helvetica" charset="0"/>
+                <a:cs typeface="Helvetica" charset="0"/>
+              </a:rPr>
+              <a:t>I participate in a global artistic community that has emerged across social networks and streaming platforms over the past eight-or-so years. </a:t>
+            </a:r>
+          </a:p>
+          <a:p>
+            <a:pPr fontAlgn="base"/>
+            <a:r>
+              <a:rPr lang="en-US" dirty="0">
+                <a:latin typeface="Helvetica" charset="0"/>
+                <a:ea typeface="Helvetica" charset="0"/>
+                <a:cs typeface="Helvetica" charset="0"/>
+              </a:rPr>
+              <a:t>While the community has gathered loosely around a genre we call </a:t>
+            </a:r>
+            <a:r>
+              <a:rPr lang="en-US" i="1" dirty="0">
+                <a:latin typeface="Helvetica" charset="0"/>
+                <a:ea typeface="Helvetica" charset="0"/>
+                <a:cs typeface="Helvetica" charset="0"/>
+              </a:rPr>
+              <a:t>wave</a:t>
+            </a:r>
+            <a:r>
+              <a:rPr lang="en-US" dirty="0">
+                <a:latin typeface="Helvetica" charset="0"/>
+                <a:ea typeface="Helvetica" charset="0"/>
+                <a:cs typeface="Helvetica" charset="0"/>
+              </a:rPr>
+              <a:t>, the deeper point is the common support and distributed growth that is </a:t>
+            </a:r>
             <a:r>
               <a:rPr lang="en-US" dirty="0" smtClean="0">
-                <a:latin typeface="Helvetica Neue" charset="0"/>
-                <a:ea typeface="Helvetica Neue" charset="0"/>
-                <a:cs typeface="Helvetica Neue" charset="0"/>
+                <a:latin typeface="Helvetica" charset="0"/>
+                <a:ea typeface="Helvetica" charset="0"/>
+                <a:cs typeface="Helvetica" charset="0"/>
               </a:rPr>
-              <a:t>Catch-all name given to a set of musical tendencies developed across the social networks and streaming platforms over the past eight-or-so years. </a:t>
-            </a:r>
-            <a:endParaRPr lang="en-US" dirty="0">
-              <a:latin typeface="Helvetica Neue" charset="0"/>
-              <a:ea typeface="Helvetica Neue" charset="0"/>
-              <a:cs typeface="Helvetica Neue" charset="0"/>
-            </a:endParaRPr>
-          </a:p>
-          <a:p>
-            <a:r>
-              <a:rPr lang="en-US" dirty="0" smtClean="0">
-                <a:latin typeface="Helvetica Neue" charset="0"/>
-                <a:ea typeface="Helvetica Neue" charset="0"/>
-                <a:cs typeface="Helvetica Neue" charset="0"/>
+              <a:t>occurring </a:t>
+            </a:r>
+            <a:r>
+              <a:rPr lang="en-US" dirty="0">
+                <a:latin typeface="Helvetica" charset="0"/>
+                <a:ea typeface="Helvetica" charset="0"/>
+                <a:cs typeface="Helvetica" charset="0"/>
               </a:rPr>
-              <a:t>Community of thousands of people reaching across all continents, joined together through the internet. </a:t>
-            </a:r>
-          </a:p>
-          <a:p>
-            <a:r>
-              <a:rPr lang="en-US" dirty="0" smtClean="0">
-                <a:latin typeface="Helvetica Neue" charset="0"/>
-                <a:ea typeface="Helvetica Neue" charset="0"/>
-                <a:cs typeface="Helvetica Neue" charset="0"/>
+              <a:t>around the world. </a:t>
+            </a:r>
+          </a:p>
+          <a:p>
+            <a:pPr lvl="1" fontAlgn="base"/>
+            <a:r>
+              <a:rPr lang="en-US" dirty="0">
+                <a:latin typeface="Helvetica" charset="0"/>
+                <a:ea typeface="Helvetica" charset="0"/>
+                <a:cs typeface="Helvetica" charset="0"/>
               </a:rPr>
-              <a:t>Have seen rapid growth from URL ➡ IRL with the sprouting of record labels, art collectives, promotion agencies, sound design companies, and cross-continent tours.</a:t>
-            </a:r>
-          </a:p>
-          <a:p>
-            <a:r>
-              <a:rPr lang="en-US" dirty="0" smtClean="0">
-                <a:latin typeface="Helvetica Neue" charset="0"/>
-                <a:ea typeface="Helvetica Neue" charset="0"/>
-                <a:cs typeface="Helvetica Neue" charset="0"/>
+              <a:t>Have seen rapid growth from URL ➡ IRL with the sprouting of record labels, art collectives, promotion agencies, sound design companies, regular club nights, and cross-continental tours.</a:t>
+            </a:r>
+          </a:p>
+          <a:p>
+            <a:pPr fontAlgn="base"/>
+            <a:r>
+              <a:rPr lang="en-US" dirty="0">
+                <a:latin typeface="Helvetica" charset="0"/>
+                <a:ea typeface="Helvetica" charset="0"/>
+                <a:cs typeface="Helvetica" charset="0"/>
               </a:rPr>
               <a:t>Currently, the way you access, experience, and participate in this community is fractured across Facebook groups, sub-</a:t>
             </a:r>
             <a:r>
-              <a:rPr lang="en-US" dirty="0" err="1" smtClean="0">
-                <a:latin typeface="Helvetica Neue" charset="0"/>
-                <a:ea typeface="Helvetica Neue" charset="0"/>
-                <a:cs typeface="Helvetica Neue" charset="0"/>
+              <a:rPr lang="en-US" dirty="0" err="1">
+                <a:latin typeface="Helvetica" charset="0"/>
+                <a:ea typeface="Helvetica" charset="0"/>
+                <a:cs typeface="Helvetica" charset="0"/>
               </a:rPr>
               <a:t>reddits</a:t>
             </a:r>
             <a:r>
-              <a:rPr lang="en-US" dirty="0" smtClean="0">
-                <a:latin typeface="Helvetica Neue" charset="0"/>
-                <a:ea typeface="Helvetica Neue" charset="0"/>
-                <a:cs typeface="Helvetica Neue" charset="0"/>
+              <a:rPr lang="en-US" dirty="0">
+                <a:latin typeface="Helvetica" charset="0"/>
+                <a:ea typeface="Helvetica" charset="0"/>
+                <a:cs typeface="Helvetica" charset="0"/>
               </a:rPr>
-              <a:t>, chat servers, etc</a:t>
-            </a:r>
-            <a:r>
-              <a:rPr lang="mr-IN" dirty="0" smtClean="0">
-                <a:latin typeface="Helvetica Neue" charset="0"/>
-                <a:ea typeface="Helvetica Neue" charset="0"/>
-                <a:cs typeface="Helvetica Neue" charset="0"/>
-              </a:rPr>
-              <a:t>…</a:t>
-            </a:r>
-            <a:endParaRPr lang="en-US" dirty="0" smtClean="0">
-              <a:latin typeface="Helvetica Neue" charset="0"/>
-              <a:ea typeface="Helvetica Neue" charset="0"/>
-              <a:cs typeface="Helvetica Neue" charset="0"/>
-            </a:endParaRPr>
-          </a:p>
-          <a:p>
-            <a:pPr lvl="1"/>
-            <a:r>
-              <a:rPr lang="en-US" dirty="0" smtClean="0">
-                <a:latin typeface="Helvetica Neue" charset="0"/>
-                <a:ea typeface="Helvetica Neue" charset="0"/>
-                <a:cs typeface="Helvetica Neue" charset="0"/>
+              <a:t>, chat servers, etc… </a:t>
+            </a:r>
+          </a:p>
+          <a:p>
+            <a:pPr lvl="1" fontAlgn="base"/>
+            <a:r>
+              <a:rPr lang="en-US" dirty="0">
+                <a:latin typeface="Helvetica" charset="0"/>
+                <a:ea typeface="Helvetica" charset="0"/>
+                <a:cs typeface="Helvetica" charset="0"/>
               </a:rPr>
               <a:t>The intention of Waveguide is to build a community directory that can be a hub for the network. </a:t>
             </a:r>

</xml_diff>